<commit_message>
adjust system section for DA quorum
</commit_message>
<xml_diff>
--- a/figure/0gda.pptx
+++ b/figure/0gda.pptx
@@ -197,7 +197,7 @@
           <a:p>
             <a:fld id="{462C20E8-B2A3-4719-9598-F5A8A7E8B3BE}" type="datetimeFigureOut">
               <a:rPr lang="zh-CN" altLang="en-US" smtClean="0"/>
-              <a:t>2024/2/2</a:t>
+              <a:t>2024/5/11</a:t>
             </a:fld>
             <a:endParaRPr lang="zh-CN" altLang="en-US"/>
           </a:p>
@@ -611,7 +611,7 @@
           <a:p>
             <a:fld id="{27CE5DD8-1086-404F-92CA-4EFC71C27E84}" type="datetimeFigureOut">
               <a:rPr lang="zh-CN" altLang="en-US" smtClean="0"/>
-              <a:t>2024/2/2</a:t>
+              <a:t>2024/5/11</a:t>
             </a:fld>
             <a:endParaRPr lang="zh-CN" altLang="en-US"/>
           </a:p>
@@ -809,7 +809,7 @@
           <a:p>
             <a:fld id="{27CE5DD8-1086-404F-92CA-4EFC71C27E84}" type="datetimeFigureOut">
               <a:rPr lang="zh-CN" altLang="en-US" smtClean="0"/>
-              <a:t>2024/2/2</a:t>
+              <a:t>2024/5/11</a:t>
             </a:fld>
             <a:endParaRPr lang="zh-CN" altLang="en-US"/>
           </a:p>
@@ -1017,7 +1017,7 @@
           <a:p>
             <a:fld id="{27CE5DD8-1086-404F-92CA-4EFC71C27E84}" type="datetimeFigureOut">
               <a:rPr lang="zh-CN" altLang="en-US" smtClean="0"/>
-              <a:t>2024/2/2</a:t>
+              <a:t>2024/5/11</a:t>
             </a:fld>
             <a:endParaRPr lang="zh-CN" altLang="en-US"/>
           </a:p>
@@ -1215,7 +1215,7 @@
           <a:p>
             <a:fld id="{27CE5DD8-1086-404F-92CA-4EFC71C27E84}" type="datetimeFigureOut">
               <a:rPr lang="zh-CN" altLang="en-US" smtClean="0"/>
-              <a:t>2024/2/2</a:t>
+              <a:t>2024/5/11</a:t>
             </a:fld>
             <a:endParaRPr lang="zh-CN" altLang="en-US"/>
           </a:p>
@@ -1490,7 +1490,7 @@
           <a:p>
             <a:fld id="{27CE5DD8-1086-404F-92CA-4EFC71C27E84}" type="datetimeFigureOut">
               <a:rPr lang="zh-CN" altLang="en-US" smtClean="0"/>
-              <a:t>2024/2/2</a:t>
+              <a:t>2024/5/11</a:t>
             </a:fld>
             <a:endParaRPr lang="zh-CN" altLang="en-US"/>
           </a:p>
@@ -1755,7 +1755,7 @@
           <a:p>
             <a:fld id="{27CE5DD8-1086-404F-92CA-4EFC71C27E84}" type="datetimeFigureOut">
               <a:rPr lang="zh-CN" altLang="en-US" smtClean="0"/>
-              <a:t>2024/2/2</a:t>
+              <a:t>2024/5/11</a:t>
             </a:fld>
             <a:endParaRPr lang="zh-CN" altLang="en-US"/>
           </a:p>
@@ -2167,7 +2167,7 @@
           <a:p>
             <a:fld id="{27CE5DD8-1086-404F-92CA-4EFC71C27E84}" type="datetimeFigureOut">
               <a:rPr lang="zh-CN" altLang="en-US" smtClean="0"/>
-              <a:t>2024/2/2</a:t>
+              <a:t>2024/5/11</a:t>
             </a:fld>
             <a:endParaRPr lang="zh-CN" altLang="en-US"/>
           </a:p>
@@ -2308,7 +2308,7 @@
           <a:p>
             <a:fld id="{27CE5DD8-1086-404F-92CA-4EFC71C27E84}" type="datetimeFigureOut">
               <a:rPr lang="zh-CN" altLang="en-US" smtClean="0"/>
-              <a:t>2024/2/2</a:t>
+              <a:t>2024/5/11</a:t>
             </a:fld>
             <a:endParaRPr lang="zh-CN" altLang="en-US"/>
           </a:p>
@@ -2421,7 +2421,7 @@
           <a:p>
             <a:fld id="{27CE5DD8-1086-404F-92CA-4EFC71C27E84}" type="datetimeFigureOut">
               <a:rPr lang="zh-CN" altLang="en-US" smtClean="0"/>
-              <a:t>2024/2/2</a:t>
+              <a:t>2024/5/11</a:t>
             </a:fld>
             <a:endParaRPr lang="zh-CN" altLang="en-US"/>
           </a:p>
@@ -2732,7 +2732,7 @@
           <a:p>
             <a:fld id="{27CE5DD8-1086-404F-92CA-4EFC71C27E84}" type="datetimeFigureOut">
               <a:rPr lang="zh-CN" altLang="en-US" smtClean="0"/>
-              <a:t>2024/2/2</a:t>
+              <a:t>2024/5/11</a:t>
             </a:fld>
             <a:endParaRPr lang="zh-CN" altLang="en-US"/>
           </a:p>
@@ -3020,7 +3020,7 @@
           <a:p>
             <a:fld id="{27CE5DD8-1086-404F-92CA-4EFC71C27E84}" type="datetimeFigureOut">
               <a:rPr lang="zh-CN" altLang="en-US" smtClean="0"/>
-              <a:t>2024/2/2</a:t>
+              <a:t>2024/5/11</a:t>
             </a:fld>
             <a:endParaRPr lang="zh-CN" altLang="en-US"/>
           </a:p>
@@ -3261,7 +3261,7 @@
           <a:p>
             <a:fld id="{27CE5DD8-1086-404F-92CA-4EFC71C27E84}" type="datetimeFigureOut">
               <a:rPr lang="zh-CN" altLang="en-US" smtClean="0"/>
-              <a:t>2024/2/2</a:t>
+              <a:t>2024/5/11</a:t>
             </a:fld>
             <a:endParaRPr lang="zh-CN" altLang="en-US"/>
           </a:p>
@@ -5894,7 +5894,7 @@
         </p:nvGrpSpPr>
         <p:grpSpPr>
           <a:xfrm>
-            <a:off x="5787875" y="1470137"/>
+            <a:off x="3347000" y="1477720"/>
             <a:ext cx="1004794" cy="346195"/>
             <a:chOff x="5423545" y="2373729"/>
             <a:chExt cx="1004794" cy="346195"/>
@@ -6008,15 +6008,15 @@
           </p:cNvPr>
           <p:cNvCxnSpPr>
             <a:cxnSpLocks/>
-            <a:stCxn id="1031" idx="1"/>
-            <a:endCxn id="73" idx="1"/>
+            <a:stCxn id="1031" idx="3"/>
+            <a:endCxn id="73" idx="3"/>
           </p:cNvCxnSpPr>
           <p:nvPr/>
         </p:nvCxnSpPr>
         <p:spPr>
-          <a:xfrm flipH="1">
-            <a:off x="5439898" y="1639414"/>
-            <a:ext cx="348793" cy="143"/>
+          <a:xfrm flipV="1">
+            <a:off x="4351794" y="1639557"/>
+            <a:ext cx="495917" cy="7440"/>
           </a:xfrm>
           <a:prstGeom prst="straightConnector1">
             <a:avLst/>
@@ -6301,7 +6301,7 @@
           </a:prstGeom>
           <a:ln w="50800">
             <a:prstDash val="sysDash"/>
-            <a:headEnd w="sm" len="med"/>
+            <a:headEnd type="triangle" w="sm" len="med"/>
             <a:tailEnd type="triangle" w="sm" len="med"/>
           </a:ln>
         </p:spPr>
@@ -6340,86 +6340,6 @@
           <a:xfrm flipH="1">
             <a:off x="5069462" y="2096034"/>
             <a:ext cx="74342" cy="1589222"/>
-          </a:xfrm>
-          <a:prstGeom prst="straightConnector1">
-            <a:avLst/>
-          </a:prstGeom>
-          <a:ln w="50800">
-            <a:prstDash val="sysDash"/>
-            <a:headEnd w="sm" len="med"/>
-            <a:tailEnd type="triangle" w="sm" len="med"/>
-          </a:ln>
-        </p:spPr>
-        <p:style>
-          <a:lnRef idx="1">
-            <a:schemeClr val="accent1"/>
-          </a:lnRef>
-          <a:fillRef idx="0">
-            <a:schemeClr val="accent1"/>
-          </a:fillRef>
-          <a:effectRef idx="0">
-            <a:schemeClr val="accent1"/>
-          </a:effectRef>
-          <a:fontRef idx="minor">
-            <a:schemeClr val="tx1"/>
-          </a:fontRef>
-        </p:style>
-      </p:cxnSp>
-      <p:sp>
-        <p:nvSpPr>
-          <p:cNvPr id="1050" name="文本框 1049">
-            <a:extLst>
-              <a:ext uri="{FF2B5EF4-FFF2-40B4-BE49-F238E27FC236}">
-                <a16:creationId xmlns:a16="http://schemas.microsoft.com/office/drawing/2014/main" id="{FC190BCF-C491-2FCD-1FB3-24A4F725667F}"/>
-              </a:ext>
-            </a:extLst>
-          </p:cNvPr>
-          <p:cNvSpPr txBox="1"/>
-          <p:nvPr/>
-        </p:nvSpPr>
-        <p:spPr>
-          <a:xfrm>
-            <a:off x="3576766" y="1119762"/>
-            <a:ext cx="1357516" cy="830997"/>
-          </a:xfrm>
-          <a:prstGeom prst="rect">
-            <a:avLst/>
-          </a:prstGeom>
-          <a:noFill/>
-        </p:spPr>
-        <p:txBody>
-          <a:bodyPr wrap="square" rtlCol="0">
-            <a:spAutoFit/>
-          </a:bodyPr>
-          <a:lstStyle/>
-          <a:p>
-            <a:pPr algn="ctr"/>
-            <a:r>
-              <a:rPr lang="en-US" altLang="zh-CN" sz="1600" dirty="0"/>
-              <a:t>Erasure coding data to chunks</a:t>
-            </a:r>
-            <a:endParaRPr lang="zh-CN" altLang="en-US" sz="1600" dirty="0"/>
-          </a:p>
-        </p:txBody>
-      </p:sp>
-      <p:cxnSp>
-        <p:nvCxnSpPr>
-          <p:cNvPr id="1052" name="直接箭头连接符 1051">
-            <a:extLst>
-              <a:ext uri="{FF2B5EF4-FFF2-40B4-BE49-F238E27FC236}">
-                <a16:creationId xmlns:a16="http://schemas.microsoft.com/office/drawing/2014/main" id="{065DB849-64C5-6201-F3CA-FD56E798636A}"/>
-              </a:ext>
-            </a:extLst>
-          </p:cNvPr>
-          <p:cNvCxnSpPr>
-            <a:cxnSpLocks/>
-          </p:cNvCxnSpPr>
-          <p:nvPr/>
-        </p:nvCxnSpPr>
-        <p:spPr>
-          <a:xfrm flipH="1">
-            <a:off x="5940515" y="2519175"/>
-            <a:ext cx="2421333" cy="2053341"/>
           </a:xfrm>
           <a:prstGeom prst="straightConnector1">
             <a:avLst/>
@@ -6447,10 +6367,10 @@
       </p:cxnSp>
       <p:sp>
         <p:nvSpPr>
-          <p:cNvPr id="1054" name="文本框 1053">
-            <a:extLst>
-              <a:ext uri="{FF2B5EF4-FFF2-40B4-BE49-F238E27FC236}">
-                <a16:creationId xmlns:a16="http://schemas.microsoft.com/office/drawing/2014/main" id="{638851B7-A4D1-5D27-DF83-C6749947099B}"/>
+          <p:cNvPr id="1050" name="文本框 1049">
+            <a:extLst>
+              <a:ext uri="{FF2B5EF4-FFF2-40B4-BE49-F238E27FC236}">
+                <a16:creationId xmlns:a16="http://schemas.microsoft.com/office/drawing/2014/main" id="{FC190BCF-C491-2FCD-1FB3-24A4F725667F}"/>
               </a:ext>
             </a:extLst>
           </p:cNvPr>
@@ -6458,9 +6378,9 @@
           <p:nvPr/>
         </p:nvSpPr>
         <p:spPr>
-          <a:xfrm rot="19236465">
-            <a:off x="6280243" y="3091988"/>
-            <a:ext cx="1868747" cy="338554"/>
+          <a:xfrm>
+            <a:off x="3726932" y="580949"/>
+            <a:ext cx="1357516" cy="830997"/>
           </a:xfrm>
           <a:prstGeom prst="rect">
             <a:avLst/>
@@ -6476,7 +6396,7 @@
             <a:pPr algn="ctr"/>
             <a:r>
               <a:rPr lang="en-US" altLang="zh-CN" sz="1600" dirty="0"/>
-              <a:t>DA sampling</a:t>
+              <a:t>Erasure coding data to chunks</a:t>
             </a:r>
             <a:endParaRPr lang="zh-CN" altLang="en-US" sz="1600" dirty="0"/>
           </a:p>
@@ -6620,7 +6540,7 @@
         </p:nvGrpSpPr>
         <p:grpSpPr>
           <a:xfrm>
-            <a:off x="3485123" y="1100238"/>
+            <a:off x="3640672" y="590224"/>
             <a:ext cx="421044" cy="338554"/>
             <a:chOff x="7847582" y="591228"/>
             <a:chExt cx="459321" cy="369332"/>
@@ -7123,7 +7043,7 @@
         </p:nvGrpSpPr>
         <p:grpSpPr>
           <a:xfrm>
-            <a:off x="6331045" y="3418020"/>
+            <a:off x="6249060" y="907620"/>
             <a:ext cx="421044" cy="338554"/>
             <a:chOff x="7847582" y="591228"/>
             <a:chExt cx="459321" cy="369332"/>
@@ -7402,6 +7322,323 @@
           </p:txBody>
         </p:sp>
       </p:grpSp>
+      <p:sp>
+        <p:nvSpPr>
+          <p:cNvPr id="3" name="椭圆 2">
+            <a:extLst>
+              <a:ext uri="{FF2B5EF4-FFF2-40B4-BE49-F238E27FC236}">
+                <a16:creationId xmlns:a16="http://schemas.microsoft.com/office/drawing/2014/main" id="{B15EC243-E297-6F74-068B-A93CDCA4B12E}"/>
+              </a:ext>
+            </a:extLst>
+          </p:cNvPr>
+          <p:cNvSpPr/>
+          <p:nvPr/>
+        </p:nvSpPr>
+        <p:spPr>
+          <a:xfrm>
+            <a:off x="7927017" y="1638549"/>
+            <a:ext cx="1209735" cy="3009185"/>
+          </a:xfrm>
+          <a:prstGeom prst="ellipse">
+            <a:avLst/>
+          </a:prstGeom>
+          <a:noFill/>
+          <a:ln w="41275">
+            <a:solidFill>
+              <a:schemeClr val="accent2">
+                <a:lumMod val="75000"/>
+              </a:schemeClr>
+            </a:solidFill>
+            <a:prstDash val="sysDash"/>
+          </a:ln>
+        </p:spPr>
+        <p:style>
+          <a:lnRef idx="2">
+            <a:schemeClr val="accent1">
+              <a:shade val="15000"/>
+            </a:schemeClr>
+          </a:lnRef>
+          <a:fillRef idx="1">
+            <a:schemeClr val="accent1"/>
+          </a:fillRef>
+          <a:effectRef idx="0">
+            <a:schemeClr val="accent1"/>
+          </a:effectRef>
+          <a:fontRef idx="minor">
+            <a:schemeClr val="lt1"/>
+          </a:fontRef>
+        </p:style>
+        <p:txBody>
+          <a:bodyPr rtlCol="0" anchor="ctr"/>
+          <a:lstStyle/>
+          <a:p>
+            <a:pPr algn="ctr"/>
+            <a:endParaRPr lang="zh-CN" altLang="en-US"/>
+          </a:p>
+        </p:txBody>
+      </p:sp>
+      <p:sp>
+        <p:nvSpPr>
+          <p:cNvPr id="5" name="椭圆 4">
+            <a:extLst>
+              <a:ext uri="{FF2B5EF4-FFF2-40B4-BE49-F238E27FC236}">
+                <a16:creationId xmlns:a16="http://schemas.microsoft.com/office/drawing/2014/main" id="{60848D97-FB3E-ABE7-3545-CF5BB767A80D}"/>
+              </a:ext>
+            </a:extLst>
+          </p:cNvPr>
+          <p:cNvSpPr/>
+          <p:nvPr/>
+        </p:nvSpPr>
+        <p:spPr>
+          <a:xfrm rot="19548128">
+            <a:off x="4787096" y="3258110"/>
+            <a:ext cx="1073770" cy="2515081"/>
+          </a:xfrm>
+          <a:prstGeom prst="ellipse">
+            <a:avLst/>
+          </a:prstGeom>
+          <a:noFill/>
+          <a:ln w="41275">
+            <a:solidFill>
+              <a:schemeClr val="accent2">
+                <a:lumMod val="75000"/>
+              </a:schemeClr>
+            </a:solidFill>
+            <a:prstDash val="sysDash"/>
+          </a:ln>
+        </p:spPr>
+        <p:style>
+          <a:lnRef idx="2">
+            <a:schemeClr val="accent1">
+              <a:shade val="15000"/>
+            </a:schemeClr>
+          </a:lnRef>
+          <a:fillRef idx="1">
+            <a:schemeClr val="accent1"/>
+          </a:fillRef>
+          <a:effectRef idx="0">
+            <a:schemeClr val="accent1"/>
+          </a:effectRef>
+          <a:fontRef idx="minor">
+            <a:schemeClr val="lt1"/>
+          </a:fontRef>
+        </p:style>
+        <p:txBody>
+          <a:bodyPr rtlCol="0" anchor="ctr"/>
+          <a:lstStyle/>
+          <a:p>
+            <a:pPr algn="ctr"/>
+            <a:endParaRPr lang="zh-CN" altLang="en-US"/>
+          </a:p>
+        </p:txBody>
+      </p:sp>
+      <p:sp>
+        <p:nvSpPr>
+          <p:cNvPr id="6" name="弧形 5">
+            <a:extLst>
+              <a:ext uri="{FF2B5EF4-FFF2-40B4-BE49-F238E27FC236}">
+                <a16:creationId xmlns:a16="http://schemas.microsoft.com/office/drawing/2014/main" id="{32ADF89A-3293-4E0E-0813-9DE8C0E945A9}"/>
+              </a:ext>
+            </a:extLst>
+          </p:cNvPr>
+          <p:cNvSpPr/>
+          <p:nvPr/>
+        </p:nvSpPr>
+        <p:spPr>
+          <a:xfrm>
+            <a:off x="2550667" y="1478504"/>
+            <a:ext cx="5909750" cy="883941"/>
+          </a:xfrm>
+          <a:prstGeom prst="arc">
+            <a:avLst/>
+          </a:prstGeom>
+          <a:ln w="50800">
+            <a:prstDash val="sysDash"/>
+            <a:tailEnd type="triangle" w="sm" len="med"/>
+          </a:ln>
+        </p:spPr>
+        <p:style>
+          <a:lnRef idx="1">
+            <a:schemeClr val="accent1"/>
+          </a:lnRef>
+          <a:fillRef idx="0">
+            <a:schemeClr val="accent1"/>
+          </a:fillRef>
+          <a:effectRef idx="0">
+            <a:schemeClr val="accent1"/>
+          </a:effectRef>
+          <a:fontRef idx="minor">
+            <a:schemeClr val="tx1"/>
+          </a:fontRef>
+        </p:style>
+        <p:txBody>
+          <a:bodyPr rtlCol="0" anchor="ctr"/>
+          <a:lstStyle/>
+          <a:p>
+            <a:pPr algn="ctr"/>
+            <a:endParaRPr lang="zh-CN" altLang="en-US"/>
+          </a:p>
+        </p:txBody>
+      </p:sp>
+      <p:sp>
+        <p:nvSpPr>
+          <p:cNvPr id="7" name="文本框 6">
+            <a:extLst>
+              <a:ext uri="{FF2B5EF4-FFF2-40B4-BE49-F238E27FC236}">
+                <a16:creationId xmlns:a16="http://schemas.microsoft.com/office/drawing/2014/main" id="{4E591959-ED17-343B-BA22-D472DF5D979D}"/>
+              </a:ext>
+            </a:extLst>
+          </p:cNvPr>
+          <p:cNvSpPr txBox="1"/>
+          <p:nvPr/>
+        </p:nvSpPr>
+        <p:spPr>
+          <a:xfrm>
+            <a:off x="6191228" y="920126"/>
+            <a:ext cx="2112686" cy="584775"/>
+          </a:xfrm>
+          <a:prstGeom prst="rect">
+            <a:avLst/>
+          </a:prstGeom>
+          <a:noFill/>
+        </p:spPr>
+        <p:txBody>
+          <a:bodyPr wrap="square" rtlCol="0">
+            <a:spAutoFit/>
+          </a:bodyPr>
+          <a:lstStyle/>
+          <a:p>
+            <a:pPr algn="ctr"/>
+            <a:r>
+              <a:rPr lang="en-US" altLang="zh-CN" sz="1600" dirty="0"/>
+              <a:t>Aggregated signatures of quorum</a:t>
+            </a:r>
+            <a:endParaRPr lang="zh-CN" altLang="en-US" sz="1600" dirty="0"/>
+          </a:p>
+        </p:txBody>
+      </p:sp>
+      <p:cxnSp>
+        <p:nvCxnSpPr>
+          <p:cNvPr id="24" name="直接连接符 23">
+            <a:extLst>
+              <a:ext uri="{FF2B5EF4-FFF2-40B4-BE49-F238E27FC236}">
+                <a16:creationId xmlns:a16="http://schemas.microsoft.com/office/drawing/2014/main" id="{CF90C238-9A80-BDC5-8712-86CCC0B11B86}"/>
+              </a:ext>
+            </a:extLst>
+          </p:cNvPr>
+          <p:cNvCxnSpPr>
+            <a:cxnSpLocks/>
+            <a:stCxn id="5" idx="4"/>
+          </p:cNvCxnSpPr>
+          <p:nvPr/>
+        </p:nvCxnSpPr>
+        <p:spPr>
+          <a:xfrm>
+            <a:off x="6030785" y="5555764"/>
+            <a:ext cx="1444757" cy="492290"/>
+          </a:xfrm>
+          <a:prstGeom prst="line">
+            <a:avLst/>
+          </a:prstGeom>
+          <a:ln w="12700">
+            <a:prstDash val="sysDash"/>
+          </a:ln>
+        </p:spPr>
+        <p:style>
+          <a:lnRef idx="1">
+            <a:schemeClr val="accent1"/>
+          </a:lnRef>
+          <a:fillRef idx="0">
+            <a:schemeClr val="accent1"/>
+          </a:fillRef>
+          <a:effectRef idx="0">
+            <a:schemeClr val="accent1"/>
+          </a:effectRef>
+          <a:fontRef idx="minor">
+            <a:schemeClr val="tx1"/>
+          </a:fontRef>
+        </p:style>
+      </p:cxnSp>
+      <p:cxnSp>
+        <p:nvCxnSpPr>
+          <p:cNvPr id="34" name="直接连接符 33">
+            <a:extLst>
+              <a:ext uri="{FF2B5EF4-FFF2-40B4-BE49-F238E27FC236}">
+                <a16:creationId xmlns:a16="http://schemas.microsoft.com/office/drawing/2014/main" id="{8CD2DC0D-79EA-43AD-181F-13F3C69C6B51}"/>
+              </a:ext>
+            </a:extLst>
+          </p:cNvPr>
+          <p:cNvCxnSpPr>
+            <a:cxnSpLocks/>
+            <a:stCxn id="3" idx="4"/>
+            <a:endCxn id="38" idx="0"/>
+          </p:cNvCxnSpPr>
+          <p:nvPr/>
+        </p:nvCxnSpPr>
+        <p:spPr>
+          <a:xfrm flipH="1">
+            <a:off x="8080409" y="4647734"/>
+            <a:ext cx="451476" cy="1282230"/>
+          </a:xfrm>
+          <a:prstGeom prst="line">
+            <a:avLst/>
+          </a:prstGeom>
+          <a:ln w="12700">
+            <a:prstDash val="sysDash"/>
+          </a:ln>
+        </p:spPr>
+        <p:style>
+          <a:lnRef idx="1">
+            <a:schemeClr val="accent1"/>
+          </a:lnRef>
+          <a:fillRef idx="0">
+            <a:schemeClr val="accent1"/>
+          </a:fillRef>
+          <a:effectRef idx="0">
+            <a:schemeClr val="accent1"/>
+          </a:effectRef>
+          <a:fontRef idx="minor">
+            <a:schemeClr val="tx1"/>
+          </a:fontRef>
+        </p:style>
+      </p:cxnSp>
+      <p:sp>
+        <p:nvSpPr>
+          <p:cNvPr id="38" name="文本框 37">
+            <a:extLst>
+              <a:ext uri="{FF2B5EF4-FFF2-40B4-BE49-F238E27FC236}">
+                <a16:creationId xmlns:a16="http://schemas.microsoft.com/office/drawing/2014/main" id="{FF8EA20F-71B2-AAD2-FA4D-00AD25503851}"/>
+              </a:ext>
+            </a:extLst>
+          </p:cNvPr>
+          <p:cNvSpPr txBox="1"/>
+          <p:nvPr/>
+        </p:nvSpPr>
+        <p:spPr>
+          <a:xfrm>
+            <a:off x="7024066" y="5929964"/>
+            <a:ext cx="2112686" cy="338554"/>
+          </a:xfrm>
+          <a:prstGeom prst="rect">
+            <a:avLst/>
+          </a:prstGeom>
+          <a:noFill/>
+        </p:spPr>
+        <p:txBody>
+          <a:bodyPr wrap="square" rtlCol="0">
+            <a:spAutoFit/>
+          </a:bodyPr>
+          <a:lstStyle/>
+          <a:p>
+            <a:pPr algn="ctr"/>
+            <a:r>
+              <a:rPr lang="en-US" altLang="zh-CN" sz="1600" dirty="0"/>
+              <a:t>DA quorum</a:t>
+            </a:r>
+            <a:endParaRPr lang="zh-CN" altLang="en-US" sz="1600" dirty="0"/>
+          </a:p>
+        </p:txBody>
+      </p:sp>
     </p:spTree>
     <p:extLst>
       <p:ext uri="{BB962C8B-B14F-4D97-AF65-F5344CB8AC3E}">

</xml_diff>